<commit_message>
Updated plan and day 2 presentation on AI
</commit_message>
<xml_diff>
--- a/Day 2/RU/ПоявлениеИИ.pptx
+++ b/Day 2/RU/ПоявлениеИИ.pptx
@@ -6,6 +6,7 @@
   </p:sldMasterIdLst>
   <p:sldIdLst>
     <p:sldId id="256" r:id="rId2"/>
+    <p:sldId id="257" r:id="rId3"/>
   </p:sldIdLst>
   <p:sldSz cx="12192000" cy="6858000"/>
   <p:notesSz cx="6858000" cy="9144000"/>
@@ -104,6 +105,11 @@
       </a:defRPr>
     </a:lvl9pPr>
   </p:defaultTextStyle>
+  <p:extLst>
+    <p:ext uri="{EFAFB233-063F-42B5-8137-9DF3F51BA10A}">
+      <p15:sldGuideLst xmlns:p15="http://schemas.microsoft.com/office/powerpoint/2012/main"/>
+    </p:ext>
+  </p:extLst>
 </p:presentation>
 </file>
 
@@ -3328,6 +3334,28 @@
 <file path=ppt/slides/slide1.xml><?xml version="1.0" encoding="utf-8"?>
 <p:sld xmlns:a="http://schemas.openxmlformats.org/drawingml/2006/main" xmlns:r="http://schemas.openxmlformats.org/officeDocument/2006/relationships" xmlns:p="http://schemas.openxmlformats.org/presentationml/2006/main">
   <p:cSld>
+    <p:bg>
+      <p:bgPr>
+        <a:gradFill flip="none" rotWithShape="1">
+          <a:gsLst>
+            <a:gs pos="46000">
+              <a:srgbClr val="A5FFA5"/>
+            </a:gs>
+            <a:gs pos="100000">
+              <a:srgbClr val="99FF99"/>
+            </a:gs>
+            <a:gs pos="0">
+              <a:srgbClr val="CCFFCC"/>
+            </a:gs>
+          </a:gsLst>
+          <a:path path="circle">
+            <a:fillToRect l="100000" t="100000"/>
+          </a:path>
+          <a:tileRect r="-100000" b="-100000"/>
+        </a:gradFill>
+        <a:effectLst/>
+      </p:bgPr>
+    </p:bg>
     <p:spTree>
       <p:nvGrpSpPr>
         <p:cNvPr id="1" name=""/>
@@ -3358,12 +3386,31 @@
             <p:ph type="ctrTitle"/>
           </p:nvPr>
         </p:nvSpPr>
-        <p:spPr/>
-        <p:txBody>
-          <a:bodyPr/>
-          <a:lstStyle/>
-          <a:p>
-            <a:endParaRPr lang="lv-LV"/>
+        <p:spPr>
+          <a:xfrm>
+            <a:off x="1517650" y="3351213"/>
+            <a:ext cx="9144000" cy="2387600"/>
+          </a:xfrm>
+        </p:spPr>
+        <p:txBody>
+          <a:bodyPr>
+            <a:normAutofit/>
+          </a:bodyPr>
+          <a:lstStyle/>
+          <a:p>
+            <a:r>
+              <a:rPr lang="ru-RU" sz="8800" b="1" dirty="0"/>
+              <a:t>Появление</a:t>
+            </a:r>
+            <a:r>
+              <a:rPr lang="en-US" sz="8800" b="1" dirty="0"/>
+              <a:t> </a:t>
+            </a:r>
+            <a:r>
+              <a:rPr lang="ru-RU" sz="8800" b="1" dirty="0"/>
+              <a:t>ИИ</a:t>
+            </a:r>
+            <a:endParaRPr lang="lv-LV" sz="8800" b="1" dirty="0"/>
           </a:p>
         </p:txBody>
       </p:sp>
@@ -3383,19 +3430,200 @@
             <p:ph type="subTitle" idx="1"/>
           </p:nvPr>
         </p:nvSpPr>
-        <p:spPr/>
-        <p:txBody>
-          <a:bodyPr/>
-          <a:lstStyle/>
-          <a:p>
-            <a:endParaRPr lang="lv-LV"/>
-          </a:p>
-        </p:txBody>
-      </p:sp>
+        <p:spPr>
+          <a:xfrm>
+            <a:off x="6407150" y="5568950"/>
+            <a:ext cx="4254500" cy="1917700"/>
+          </a:xfrm>
+        </p:spPr>
+        <p:txBody>
+          <a:bodyPr>
+            <a:normAutofit/>
+          </a:bodyPr>
+          <a:lstStyle/>
+          <a:p>
+            <a:r>
+              <a:rPr lang="ru-RU" sz="3200" dirty="0"/>
+              <a:t>День 2</a:t>
+            </a:r>
+            <a:endParaRPr lang="lv-LV" sz="3200" dirty="0"/>
+          </a:p>
+        </p:txBody>
+      </p:sp>
+      <p:pic>
+        <p:nvPicPr>
+          <p:cNvPr id="7" name="Picture 6">
+            <a:extLst>
+              <a:ext uri="{FF2B5EF4-FFF2-40B4-BE49-F238E27FC236}">
+                <a16:creationId xmlns:a16="http://schemas.microsoft.com/office/drawing/2014/main" id="{2ECC3A8C-3906-5900-5997-5BFC4FBA7127}"/>
+              </a:ext>
+            </a:extLst>
+          </p:cNvPr>
+          <p:cNvPicPr>
+            <a:picLocks noChangeAspect="1"/>
+          </p:cNvPicPr>
+          <p:nvPr/>
+        </p:nvPicPr>
+        <p:blipFill>
+          <a:blip r:embed="rId2"/>
+          <a:stretch>
+            <a:fillRect/>
+          </a:stretch>
+        </p:blipFill>
+        <p:spPr>
+          <a:xfrm>
+            <a:off x="1261378" y="338837"/>
+            <a:ext cx="10291544" cy="4888483"/>
+          </a:xfrm>
+          <a:prstGeom prst="rect">
+            <a:avLst/>
+          </a:prstGeom>
+        </p:spPr>
+      </p:pic>
     </p:spTree>
     <p:extLst>
       <p:ext uri="{BB962C8B-B14F-4D97-AF65-F5344CB8AC3E}">
         <p14:creationId xmlns:p14="http://schemas.microsoft.com/office/powerpoint/2010/main" val="2504895640"/>
+      </p:ext>
+    </p:extLst>
+  </p:cSld>
+  <p:clrMapOvr>
+    <a:masterClrMapping/>
+  </p:clrMapOvr>
+</p:sld>
+</file>
+
+<file path=ppt/slides/slide2.xml><?xml version="1.0" encoding="utf-8"?>
+<p:sld xmlns:a="http://schemas.openxmlformats.org/drawingml/2006/main" xmlns:r="http://schemas.openxmlformats.org/officeDocument/2006/relationships" xmlns:p="http://schemas.openxmlformats.org/presentationml/2006/main">
+  <p:cSld>
+    <p:bg>
+      <p:bgPr>
+        <a:gradFill flip="none" rotWithShape="1">
+          <a:gsLst>
+            <a:gs pos="46000">
+              <a:srgbClr val="A5FFA5"/>
+            </a:gs>
+            <a:gs pos="100000">
+              <a:srgbClr val="99FF99"/>
+            </a:gs>
+            <a:gs pos="0">
+              <a:srgbClr val="CCFFCC"/>
+            </a:gs>
+          </a:gsLst>
+          <a:path path="circle">
+            <a:fillToRect l="100000" t="100000"/>
+          </a:path>
+          <a:tileRect r="-100000" b="-100000"/>
+        </a:gradFill>
+        <a:effectLst/>
+      </p:bgPr>
+    </p:bg>
+    <p:spTree>
+      <p:nvGrpSpPr>
+        <p:cNvPr id="1" name="">
+          <a:extLst>
+            <a:ext uri="{FF2B5EF4-FFF2-40B4-BE49-F238E27FC236}">
+              <a16:creationId xmlns:a16="http://schemas.microsoft.com/office/drawing/2014/main" id="{0910C2B3-9B9A-E1F9-B769-1A6D8E583E96}"/>
+            </a:ext>
+          </a:extLst>
+        </p:cNvPr>
+        <p:cNvGrpSpPr/>
+        <p:nvPr/>
+      </p:nvGrpSpPr>
+      <p:grpSpPr>
+        <a:xfrm>
+          <a:off x="0" y="0"/>
+          <a:ext cx="0" cy="0"/>
+          <a:chOff x="0" y="0"/>
+          <a:chExt cx="0" cy="0"/>
+        </a:xfrm>
+      </p:grpSpPr>
+      <p:sp>
+        <p:nvSpPr>
+          <p:cNvPr id="2" name="Title 1">
+            <a:extLst>
+              <a:ext uri="{FF2B5EF4-FFF2-40B4-BE49-F238E27FC236}">
+                <a16:creationId xmlns:a16="http://schemas.microsoft.com/office/drawing/2014/main" id="{5AF136EA-54E4-9AA1-5193-FCBACDCFD064}"/>
+              </a:ext>
+            </a:extLst>
+          </p:cNvPr>
+          <p:cNvSpPr>
+            <a:spLocks noGrp="1"/>
+          </p:cNvSpPr>
+          <p:nvPr>
+            <p:ph type="ctrTitle"/>
+          </p:nvPr>
+        </p:nvSpPr>
+        <p:spPr>
+          <a:xfrm>
+            <a:off x="586740" y="647701"/>
+            <a:ext cx="9921240" cy="868680"/>
+          </a:xfrm>
+        </p:spPr>
+        <p:txBody>
+          <a:bodyPr anchor="t">
+            <a:normAutofit/>
+          </a:bodyPr>
+          <a:lstStyle/>
+          <a:p>
+            <a:pPr algn="l"/>
+            <a:r>
+              <a:rPr lang="ru-RU" sz="5400" b="1" dirty="0"/>
+              <a:t>Появление</a:t>
+            </a:r>
+            <a:r>
+              <a:rPr lang="en-US" sz="5400" b="1" dirty="0"/>
+              <a:t> </a:t>
+            </a:r>
+            <a:r>
+              <a:rPr lang="ru-RU" sz="5400" b="1" dirty="0"/>
+              <a:t>ИИ</a:t>
+            </a:r>
+            <a:endParaRPr lang="lv-LV" sz="5400" b="1" dirty="0"/>
+          </a:p>
+        </p:txBody>
+      </p:sp>
+      <p:sp>
+        <p:nvSpPr>
+          <p:cNvPr id="3" name="Subtitle 2">
+            <a:extLst>
+              <a:ext uri="{FF2B5EF4-FFF2-40B4-BE49-F238E27FC236}">
+                <a16:creationId xmlns:a16="http://schemas.microsoft.com/office/drawing/2014/main" id="{067EFAB1-18AC-4265-01A2-2439B5D5A811}"/>
+              </a:ext>
+            </a:extLst>
+          </p:cNvPr>
+          <p:cNvSpPr>
+            <a:spLocks noGrp="1"/>
+          </p:cNvSpPr>
+          <p:nvPr>
+            <p:ph type="subTitle" idx="1"/>
+          </p:nvPr>
+        </p:nvSpPr>
+        <p:spPr>
+          <a:xfrm>
+            <a:off x="586740" y="1516380"/>
+            <a:ext cx="10698480" cy="2171699"/>
+          </a:xfrm>
+        </p:spPr>
+        <p:txBody>
+          <a:bodyPr>
+            <a:normAutofit/>
+          </a:bodyPr>
+          <a:lstStyle/>
+          <a:p>
+            <a:pPr algn="l"/>
+            <a:r>
+              <a:rPr lang="ru-RU" sz="2800" dirty="0"/>
+              <a:t>День 2</a:t>
+            </a:r>
+            <a:endParaRPr lang="lv-LV" sz="2800" dirty="0"/>
+          </a:p>
+        </p:txBody>
+      </p:sp>
+    </p:spTree>
+    <p:extLst>
+      <p:ext uri="{BB962C8B-B14F-4D97-AF65-F5344CB8AC3E}">
+        <p14:creationId xmlns:p14="http://schemas.microsoft.com/office/powerpoint/2010/main" val="1347293514"/>
       </p:ext>
     </p:extLst>
   </p:cSld>

</xml_diff>

<commit_message>
Added tasks to day 1 and day 2 in plan.xlsx and added txt file for github link
</commit_message>
<xml_diff>
--- a/Day 2/RU/ПоявлениеИИ.pptx
+++ b/Day 2/RU/ПоявлениеИИ.pptx
@@ -3480,6 +3480,277 @@
           </a:prstGeom>
         </p:spPr>
       </p:pic>
+      <p:sp>
+        <p:nvSpPr>
+          <p:cNvPr id="10" name="Title 1">
+            <a:extLst>
+              <a:ext uri="{FF2B5EF4-FFF2-40B4-BE49-F238E27FC236}">
+                <a16:creationId xmlns:a16="http://schemas.microsoft.com/office/drawing/2014/main" id="{F370EC56-E98E-B277-7053-40E0CB532D11}"/>
+              </a:ext>
+            </a:extLst>
+          </p:cNvPr>
+          <p:cNvSpPr txBox="1">
+            <a:spLocks/>
+          </p:cNvSpPr>
+          <p:nvPr/>
+        </p:nvSpPr>
+        <p:spPr>
+          <a:xfrm>
+            <a:off x="586740" y="-3043171"/>
+            <a:ext cx="9921240" cy="868680"/>
+          </a:xfrm>
+          <a:prstGeom prst="rect">
+            <a:avLst/>
+          </a:prstGeom>
+        </p:spPr>
+        <p:txBody>
+          <a:bodyPr vert="horz" lIns="91440" tIns="45720" rIns="91440" bIns="45720" rtlCol="0" anchor="t">
+            <a:noAutofit/>
+          </a:bodyPr>
+          <a:lstStyle>
+            <a:lvl1pPr algn="ctr" defTabSz="914400" rtl="0" eaLnBrk="1" latinLnBrk="0" hangingPunct="1">
+              <a:lnSpc>
+                <a:spcPct val="90000"/>
+              </a:lnSpc>
+              <a:spcBef>
+                <a:spcPct val="0"/>
+              </a:spcBef>
+              <a:buNone/>
+              <a:defRPr sz="6000" kern="1200">
+                <a:solidFill>
+                  <a:schemeClr val="tx1"/>
+                </a:solidFill>
+                <a:latin typeface="+mj-lt"/>
+                <a:ea typeface="+mj-ea"/>
+                <a:cs typeface="+mj-cs"/>
+              </a:defRPr>
+            </a:lvl1pPr>
+          </a:lstStyle>
+          <a:p>
+            <a:pPr algn="l"/>
+            <a:r>
+              <a:rPr lang="ru-RU" sz="4400" b="1"/>
+              <a:t>Введение в искусственный интеллект</a:t>
+            </a:r>
+            <a:endParaRPr lang="lv-LV" sz="4400" b="1" dirty="0"/>
+          </a:p>
+        </p:txBody>
+      </p:sp>
+      <p:sp>
+        <p:nvSpPr>
+          <p:cNvPr id="11" name="Subtitle 2">
+            <a:extLst>
+              <a:ext uri="{FF2B5EF4-FFF2-40B4-BE49-F238E27FC236}">
+                <a16:creationId xmlns:a16="http://schemas.microsoft.com/office/drawing/2014/main" id="{603918EF-F5C7-D181-B427-70A16C0E4062}"/>
+              </a:ext>
+            </a:extLst>
+          </p:cNvPr>
+          <p:cNvSpPr txBox="1">
+            <a:spLocks/>
+          </p:cNvSpPr>
+          <p:nvPr/>
+        </p:nvSpPr>
+        <p:spPr>
+          <a:xfrm>
+            <a:off x="586740" y="-2174492"/>
+            <a:ext cx="10698480" cy="2171699"/>
+          </a:xfrm>
+          <a:prstGeom prst="rect">
+            <a:avLst/>
+          </a:prstGeom>
+        </p:spPr>
+        <p:txBody>
+          <a:bodyPr vert="horz" lIns="91440" tIns="45720" rIns="91440" bIns="45720" rtlCol="0">
+            <a:normAutofit/>
+          </a:bodyPr>
+          <a:lstStyle>
+            <a:lvl1pPr marL="0" indent="0" algn="ctr" defTabSz="914400" rtl="0" eaLnBrk="1" latinLnBrk="0" hangingPunct="1">
+              <a:lnSpc>
+                <a:spcPct val="90000"/>
+              </a:lnSpc>
+              <a:spcBef>
+                <a:spcPts val="1000"/>
+              </a:spcBef>
+              <a:buFont typeface="Arial" panose="020B0604020202020204" pitchFamily="34" charset="0"/>
+              <a:buNone/>
+              <a:defRPr sz="2400" kern="1200">
+                <a:solidFill>
+                  <a:schemeClr val="tx1"/>
+                </a:solidFill>
+                <a:latin typeface="+mn-lt"/>
+                <a:ea typeface="+mn-ea"/>
+                <a:cs typeface="+mn-cs"/>
+              </a:defRPr>
+            </a:lvl1pPr>
+            <a:lvl2pPr marL="457200" indent="0" algn="ctr" defTabSz="914400" rtl="0" eaLnBrk="1" latinLnBrk="0" hangingPunct="1">
+              <a:lnSpc>
+                <a:spcPct val="90000"/>
+              </a:lnSpc>
+              <a:spcBef>
+                <a:spcPts val="500"/>
+              </a:spcBef>
+              <a:buFont typeface="Arial" panose="020B0604020202020204" pitchFamily="34" charset="0"/>
+              <a:buNone/>
+              <a:defRPr sz="2000" kern="1200">
+                <a:solidFill>
+                  <a:schemeClr val="tx1"/>
+                </a:solidFill>
+                <a:latin typeface="+mn-lt"/>
+                <a:ea typeface="+mn-ea"/>
+                <a:cs typeface="+mn-cs"/>
+              </a:defRPr>
+            </a:lvl2pPr>
+            <a:lvl3pPr marL="914400" indent="0" algn="ctr" defTabSz="914400" rtl="0" eaLnBrk="1" latinLnBrk="0" hangingPunct="1">
+              <a:lnSpc>
+                <a:spcPct val="90000"/>
+              </a:lnSpc>
+              <a:spcBef>
+                <a:spcPts val="500"/>
+              </a:spcBef>
+              <a:buFont typeface="Arial" panose="020B0604020202020204" pitchFamily="34" charset="0"/>
+              <a:buNone/>
+              <a:defRPr sz="1800" kern="1200">
+                <a:solidFill>
+                  <a:schemeClr val="tx1"/>
+                </a:solidFill>
+                <a:latin typeface="+mn-lt"/>
+                <a:ea typeface="+mn-ea"/>
+                <a:cs typeface="+mn-cs"/>
+              </a:defRPr>
+            </a:lvl3pPr>
+            <a:lvl4pPr marL="1371600" indent="0" algn="ctr" defTabSz="914400" rtl="0" eaLnBrk="1" latinLnBrk="0" hangingPunct="1">
+              <a:lnSpc>
+                <a:spcPct val="90000"/>
+              </a:lnSpc>
+              <a:spcBef>
+                <a:spcPts val="500"/>
+              </a:spcBef>
+              <a:buFont typeface="Arial" panose="020B0604020202020204" pitchFamily="34" charset="0"/>
+              <a:buNone/>
+              <a:defRPr sz="1600" kern="1200">
+                <a:solidFill>
+                  <a:schemeClr val="tx1"/>
+                </a:solidFill>
+                <a:latin typeface="+mn-lt"/>
+                <a:ea typeface="+mn-ea"/>
+                <a:cs typeface="+mn-cs"/>
+              </a:defRPr>
+            </a:lvl4pPr>
+            <a:lvl5pPr marL="1828800" indent="0" algn="ctr" defTabSz="914400" rtl="0" eaLnBrk="1" latinLnBrk="0" hangingPunct="1">
+              <a:lnSpc>
+                <a:spcPct val="90000"/>
+              </a:lnSpc>
+              <a:spcBef>
+                <a:spcPts val="500"/>
+              </a:spcBef>
+              <a:buFont typeface="Arial" panose="020B0604020202020204" pitchFamily="34" charset="0"/>
+              <a:buNone/>
+              <a:defRPr sz="1600" kern="1200">
+                <a:solidFill>
+                  <a:schemeClr val="tx1"/>
+                </a:solidFill>
+                <a:latin typeface="+mn-lt"/>
+                <a:ea typeface="+mn-ea"/>
+                <a:cs typeface="+mn-cs"/>
+              </a:defRPr>
+            </a:lvl5pPr>
+            <a:lvl6pPr marL="2286000" indent="0" algn="ctr" defTabSz="914400" rtl="0" eaLnBrk="1" latinLnBrk="0" hangingPunct="1">
+              <a:lnSpc>
+                <a:spcPct val="90000"/>
+              </a:lnSpc>
+              <a:spcBef>
+                <a:spcPts val="500"/>
+              </a:spcBef>
+              <a:buFont typeface="Arial" panose="020B0604020202020204" pitchFamily="34" charset="0"/>
+              <a:buNone/>
+              <a:defRPr sz="1600" kern="1200">
+                <a:solidFill>
+                  <a:schemeClr val="tx1"/>
+                </a:solidFill>
+                <a:latin typeface="+mn-lt"/>
+                <a:ea typeface="+mn-ea"/>
+                <a:cs typeface="+mn-cs"/>
+              </a:defRPr>
+            </a:lvl6pPr>
+            <a:lvl7pPr marL="2743200" indent="0" algn="ctr" defTabSz="914400" rtl="0" eaLnBrk="1" latinLnBrk="0" hangingPunct="1">
+              <a:lnSpc>
+                <a:spcPct val="90000"/>
+              </a:lnSpc>
+              <a:spcBef>
+                <a:spcPts val="500"/>
+              </a:spcBef>
+              <a:buFont typeface="Arial" panose="020B0604020202020204" pitchFamily="34" charset="0"/>
+              <a:buNone/>
+              <a:defRPr sz="1600" kern="1200">
+                <a:solidFill>
+                  <a:schemeClr val="tx1"/>
+                </a:solidFill>
+                <a:latin typeface="+mn-lt"/>
+                <a:ea typeface="+mn-ea"/>
+                <a:cs typeface="+mn-cs"/>
+              </a:defRPr>
+            </a:lvl7pPr>
+            <a:lvl8pPr marL="3200400" indent="0" algn="ctr" defTabSz="914400" rtl="0" eaLnBrk="1" latinLnBrk="0" hangingPunct="1">
+              <a:lnSpc>
+                <a:spcPct val="90000"/>
+              </a:lnSpc>
+              <a:spcBef>
+                <a:spcPts val="500"/>
+              </a:spcBef>
+              <a:buFont typeface="Arial" panose="020B0604020202020204" pitchFamily="34" charset="0"/>
+              <a:buNone/>
+              <a:defRPr sz="1600" kern="1200">
+                <a:solidFill>
+                  <a:schemeClr val="tx1"/>
+                </a:solidFill>
+                <a:latin typeface="+mn-lt"/>
+                <a:ea typeface="+mn-ea"/>
+                <a:cs typeface="+mn-cs"/>
+              </a:defRPr>
+            </a:lvl8pPr>
+            <a:lvl9pPr marL="3657600" indent="0" algn="ctr" defTabSz="914400" rtl="0" eaLnBrk="1" latinLnBrk="0" hangingPunct="1">
+              <a:lnSpc>
+                <a:spcPct val="90000"/>
+              </a:lnSpc>
+              <a:spcBef>
+                <a:spcPts val="500"/>
+              </a:spcBef>
+              <a:buFont typeface="Arial" panose="020B0604020202020204" pitchFamily="34" charset="0"/>
+              <a:buNone/>
+              <a:defRPr sz="1600" kern="1200">
+                <a:solidFill>
+                  <a:schemeClr val="tx1"/>
+                </a:solidFill>
+                <a:latin typeface="+mn-lt"/>
+                <a:ea typeface="+mn-ea"/>
+                <a:cs typeface="+mn-cs"/>
+              </a:defRPr>
+            </a:lvl9pPr>
+          </a:lstStyle>
+          <a:p>
+            <a:pPr marL="457200" indent="-457200" algn="l">
+              <a:buFont typeface="Arial" panose="020B0604020202020204" pitchFamily="34" charset="0"/>
+              <a:buChar char="•"/>
+            </a:pPr>
+            <a:r>
+              <a:rPr lang="ru-RU" sz="2800"/>
+              <a:t>Искусственный интеллект (ИИ) — это способность машины выполнять задачи, требующие человеческого интеллекта.</a:t>
+            </a:r>
+            <a:endParaRPr lang="en-US" sz="2800"/>
+          </a:p>
+          <a:p>
+            <a:pPr marL="457200" indent="-457200" algn="l">
+              <a:buFont typeface="Arial" panose="020B0604020202020204" pitchFamily="34" charset="0"/>
+              <a:buChar char="•"/>
+            </a:pPr>
+            <a:r>
+              <a:rPr lang="ru-RU" sz="2800"/>
+              <a:t>Сегодня ИИ используется повсюду: от голосовых помощников до медицинской диагностики.</a:t>
+            </a:r>
+            <a:endParaRPr lang="lv-LV" sz="2800" dirty="0"/>
+          </a:p>
+        </p:txBody>
+      </p:sp>
     </p:spTree>
     <p:extLst>
       <p:ext uri="{BB962C8B-B14F-4D97-AF65-F5344CB8AC3E}">
@@ -3500,13 +3771,13 @@
       <p:bgPr>
         <a:gradFill flip="none" rotWithShape="1">
           <a:gsLst>
-            <a:gs pos="46000">
-              <a:srgbClr val="A5FFA5"/>
+            <a:gs pos="38000">
+              <a:srgbClr val="A4FFCC"/>
+            </a:gs>
+            <a:gs pos="0">
+              <a:srgbClr val="99FFCC"/>
             </a:gs>
             <a:gs pos="100000">
-              <a:srgbClr val="99FF99"/>
-            </a:gs>
-            <a:gs pos="0">
               <a:srgbClr val="CCFFCC"/>
             </a:gs>
           </a:gsLst>
@@ -3562,24 +3833,16 @@
         </p:spPr>
         <p:txBody>
           <a:bodyPr anchor="t">
-            <a:normAutofit/>
+            <a:noAutofit/>
           </a:bodyPr>
           <a:lstStyle/>
           <a:p>
             <a:pPr algn="l"/>
             <a:r>
-              <a:rPr lang="ru-RU" sz="5400" b="1" dirty="0"/>
-              <a:t>Появление</a:t>
-            </a:r>
-            <a:r>
-              <a:rPr lang="en-US" sz="5400" b="1" dirty="0"/>
-              <a:t> </a:t>
-            </a:r>
-            <a:r>
-              <a:rPr lang="ru-RU" sz="5400" b="1" dirty="0"/>
-              <a:t>ИИ</a:t>
-            </a:r>
-            <a:endParaRPr lang="lv-LV" sz="5400" b="1" dirty="0"/>
+              <a:rPr lang="ru-RU" sz="4400" b="1" dirty="0"/>
+              <a:t>Введение в искусственный интеллект</a:t>
+            </a:r>
+            <a:endParaRPr lang="lv-LV" sz="4400" b="1" dirty="0"/>
           </a:p>
         </p:txBody>
       </p:sp>
@@ -3611,10 +3874,24 @@
           </a:bodyPr>
           <a:lstStyle/>
           <a:p>
-            <a:pPr algn="l"/>
+            <a:pPr marL="457200" indent="-457200" algn="l">
+              <a:buFont typeface="Arial" panose="020B0604020202020204" pitchFamily="34" charset="0"/>
+              <a:buChar char="•"/>
+            </a:pPr>
             <a:r>
               <a:rPr lang="ru-RU" sz="2800" dirty="0"/>
-              <a:t>День 2</a:t>
+              <a:t>Искусственный интеллект (ИИ) — это способность машины выполнять задачи, требующие человеческого интеллекта.</a:t>
+            </a:r>
+            <a:endParaRPr lang="en-US" sz="2800" dirty="0"/>
+          </a:p>
+          <a:p>
+            <a:pPr marL="457200" indent="-457200" algn="l">
+              <a:buFont typeface="Arial" panose="020B0604020202020204" pitchFamily="34" charset="0"/>
+              <a:buChar char="•"/>
+            </a:pPr>
+            <a:r>
+              <a:rPr lang="ru-RU" sz="2800" dirty="0"/>
+              <a:t>Сегодня ИИ используется повсюду: от голосовых помощников до медицинской диагностики.</a:t>
             </a:r>
             <a:endParaRPr lang="lv-LV" sz="2800" dirty="0"/>
           </a:p>
@@ -3630,6 +3907,18 @@
   <p:clrMapOvr>
     <a:masterClrMapping/>
   </p:clrMapOvr>
+  <mc:AlternateContent xmlns:mc="http://schemas.openxmlformats.org/markup-compatibility/2006">
+    <mc:Choice xmlns:p159="http://schemas.microsoft.com/office/powerpoint/2015/09/main" Requires="p159">
+      <p:transition xmlns:p14="http://schemas.microsoft.com/office/powerpoint/2010/main" spd="slow" p14:dur="2000">
+        <p159:morph option="byChar"/>
+      </p:transition>
+    </mc:Choice>
+    <mc:Fallback>
+      <p:transition spd="slow">
+        <p:fade/>
+      </p:transition>
+    </mc:Fallback>
+  </mc:AlternateContent>
 </p:sld>
 </file>
 

</xml_diff>